<commit_message>
changed from Linq-To-SQL to Entities-To-SQL
</commit_message>
<xml_diff>
--- a/2010/lectures/10. ASP.NET-and-Databases.pptx
+++ b/2010/lectures/10. ASP.NET-and-Databases.pptx
@@ -286,7 +286,7 @@
             <a:fld id="{3BF7C7B5-275F-4D1F-9AB4-9255447DBC73}" type="datetimeFigureOut">
               <a:rPr lang="en-US"/>
               <a:pPr/>
-              <a:t>10/11/2010</a:t>
+              <a:t>12/10/2010</a:t>
             </a:fld>
             <a:endParaRPr lang="en-US" dirty="0"/>
           </a:p>
@@ -517,7 +517,7 @@
             <a:fld id="{9B46F231-FB2B-4655-A644-E2477325E686}" type="datetimeFigureOut">
               <a:rPr lang="en-US"/>
               <a:pPr/>
-              <a:t>10/11/2010</a:t>
+              <a:t>12/10/2010</a:t>
             </a:fld>
             <a:endParaRPr lang="en-US" dirty="0"/>
           </a:p>
@@ -2100,7 +2100,7 @@
               </a:rPr>
               <a:t>Бележки на автора:</a:t>
             </a:r>
-            <a:endParaRPr lang="en-US" b="1">
+            <a:endParaRPr lang="en-US" b="1" dirty="0">
               <a:effectLst>
                 <a:outerShdw blurRad="38100" dist="38100" dir="2700000" algn="tl">
                   <a:srgbClr val="C0C0C0"/>
@@ -2546,10 +2546,10 @@
               <a:rPr lang="bg-BG"/>
               <a:t> object represents.</a:t>
             </a:r>
-            <a:endParaRPr lang="en-US"/>
-          </a:p>
-          <a:p>
-            <a:endParaRPr lang="en-US"/>
+            <a:endParaRPr lang="en-US" dirty="0"/>
+          </a:p>
+          <a:p>
+            <a:endParaRPr lang="en-US" dirty="0"/>
           </a:p>
           <a:p>
             <a:r>
@@ -2729,10 +2729,10 @@
               <a:rPr lang="bg-BG"/>
               <a:t> object represents.</a:t>
             </a:r>
-            <a:endParaRPr lang="en-US"/>
-          </a:p>
-          <a:p>
-            <a:endParaRPr lang="en-US"/>
+            <a:endParaRPr lang="en-US" dirty="0"/>
+          </a:p>
+          <a:p>
+            <a:endParaRPr lang="en-US" dirty="0"/>
           </a:p>
           <a:p>
             <a:r>
@@ -2912,10 +2912,10 @@
               <a:rPr lang="bg-BG"/>
               <a:t> object represents.</a:t>
             </a:r>
-            <a:endParaRPr lang="en-US"/>
-          </a:p>
-          <a:p>
-            <a:endParaRPr lang="en-US"/>
+            <a:endParaRPr lang="en-US" dirty="0"/>
+          </a:p>
+          <a:p>
+            <a:endParaRPr lang="en-US" dirty="0"/>
           </a:p>
           <a:p>
             <a:r>
@@ -3095,10 +3095,10 @@
               <a:rPr lang="bg-BG"/>
               <a:t> object represents.</a:t>
             </a:r>
-            <a:endParaRPr lang="en-US"/>
-          </a:p>
-          <a:p>
-            <a:endParaRPr lang="en-US"/>
+            <a:endParaRPr lang="en-US" dirty="0"/>
+          </a:p>
+          <a:p>
+            <a:endParaRPr lang="en-US" dirty="0"/>
           </a:p>
           <a:p>
             <a:r>
@@ -8406,7 +8406,19 @@
             </a:pPr>
             <a:r>
               <a:rPr lang="en-US" dirty="0" smtClean="0"/>
-              <a:t>Define the data model (e.g. LINQ to SQL mappings)</a:t>
+              <a:t>Define the data model (e.g. </a:t>
+            </a:r>
+            <a:r>
+              <a:rPr lang="en-US" dirty="0" smtClean="0"/>
+              <a:t>Entity</a:t>
+            </a:r>
+            <a:r>
+              <a:rPr lang="en-US" dirty="0" smtClean="0"/>
+              <a:t> </a:t>
+            </a:r>
+            <a:r>
+              <a:rPr lang="en-US" dirty="0" smtClean="0"/>
+              <a:t>to SQL mappings)</a:t>
             </a:r>
           </a:p>
           <a:p>
@@ -8519,48 +8531,6 @@
           </a:p>
         </p:txBody>
       </p:sp>
-      <p:pic>
-        <p:nvPicPr>
-          <p:cNvPr id="641028" name="Picture 4" descr="linq"/>
-          <p:cNvPicPr>
-            <a:picLocks noChangeAspect="1" noChangeArrowheads="1"/>
-          </p:cNvPicPr>
-          <p:nvPr/>
-        </p:nvPicPr>
-        <p:blipFill>
-          <a:blip r:embed="rId3">
-            <a:extLst>
-              <a:ext uri="{28A0092B-C50C-407E-A947-70E740481C1C}">
-                <a14:useLocalDpi xmlns:a14="http://schemas.microsoft.com/office/drawing/2010/main" val="0"/>
-              </a:ext>
-            </a:extLst>
-          </a:blip>
-          <a:srcRect/>
-          <a:stretch>
-            <a:fillRect/>
-          </a:stretch>
-        </p:blipFill>
-        <p:spPr bwMode="auto">
-          <a:xfrm>
-            <a:off x="2474159" y="2208960"/>
-            <a:ext cx="3967082" cy="2591640"/>
-          </a:xfrm>
-          <a:prstGeom prst="roundRect">
-            <a:avLst>
-              <a:gd name="adj" fmla="val 5101"/>
-            </a:avLst>
-          </a:prstGeom>
-          <a:noFill/>
-          <a:ln w="6350">
-            <a:solidFill>
-              <a:srgbClr val="000000"/>
-            </a:solidFill>
-            <a:miter lim="800000"/>
-            <a:headEnd/>
-            <a:tailEnd/>
-          </a:ln>
-        </p:spPr>
-      </p:pic>
       <p:sp>
         <p:nvSpPr>
           <p:cNvPr id="641029" name="Rectangle 5"/>
@@ -8702,6 +8672,70 @@
           </a:p>
         </p:txBody>
       </p:sp>
+      <p:pic>
+        <p:nvPicPr>
+          <p:cNvPr id="2050" name="Picture 2"/>
+          <p:cNvPicPr>
+            <a:picLocks noChangeAspect="1" noChangeArrowheads="1"/>
+          </p:cNvPicPr>
+          <p:nvPr/>
+        </p:nvPicPr>
+        <p:blipFill>
+          <a:blip r:embed="rId3" cstate="print">
+            <a:extLst>
+              <a:ext uri="{28A0092B-C50C-407E-A947-70E740481C1C}">
+                <a14:useLocalDpi xmlns:a14="http://schemas.microsoft.com/office/drawing/2010/main" val="0"/>
+              </a:ext>
+            </a:extLst>
+          </a:blip>
+          <a:srcRect/>
+          <a:stretch>
+            <a:fillRect/>
+          </a:stretch>
+        </p:blipFill>
+        <p:spPr bwMode="auto">
+          <a:xfrm>
+            <a:off x="2505075" y="2209800"/>
+            <a:ext cx="4133850" cy="2495384"/>
+          </a:xfrm>
+          <a:prstGeom prst="roundRect">
+            <a:avLst/>
+          </a:prstGeom>
+          <a:noFill/>
+          <a:ln>
+            <a:noFill/>
+          </a:ln>
+          <a:effectLst/>
+          <a:extLst>
+            <a:ext uri="{909E8E84-426E-40DD-AFC4-6F175D3DCCD1}">
+              <a14:hiddenFill xmlns:a14="http://schemas.microsoft.com/office/drawing/2010/main">
+                <a:solidFill>
+                  <a:schemeClr val="accent1"/>
+                </a:solidFill>
+              </a14:hiddenFill>
+            </a:ext>
+            <a:ext uri="{91240B29-F687-4F45-9708-019B960494DF}">
+              <a14:hiddenLine xmlns:a14="http://schemas.microsoft.com/office/drawing/2010/main" w="9525">
+                <a:solidFill>
+                  <a:schemeClr val="tx1"/>
+                </a:solidFill>
+                <a:miter lim="800000"/>
+                <a:headEnd/>
+                <a:tailEnd/>
+              </a14:hiddenLine>
+            </a:ext>
+            <a:ext uri="{AF507438-7753-43E0-B8FC-AC1667EBCBE1}">
+              <a14:hiddenEffects xmlns:a14="http://schemas.microsoft.com/office/drawing/2010/main">
+                <a:effectLst>
+                  <a:outerShdw dist="35921" dir="2700000" algn="ctr" rotWithShape="0">
+                    <a:schemeClr val="bg2"/>
+                  </a:outerShdw>
+                </a:effectLst>
+              </a14:hiddenEffects>
+            </a:ext>
+          </a:extLst>
+        </p:spPr>
+      </p:pic>
     </p:spTree>
   </p:cSld>
   <p:clrMapOvr>
@@ -8887,7 +8921,11 @@
             </a:pPr>
             <a:r>
               <a:rPr lang="en-US" dirty="0" smtClean="0"/>
-              <a:t>Select the new "</a:t>
+              <a:t>Select the new </a:t>
+            </a:r>
+            <a:r>
+              <a:rPr lang="en-US" dirty="0" smtClean="0"/>
+              <a:t>"</a:t>
             </a:r>
             <a:r>
               <a:rPr lang="en-US" dirty="0" smtClean="0">
@@ -8898,11 +8936,15 @@
                   </a:schemeClr>
                 </a:solidFill>
               </a:rPr>
-              <a:t>LINQ</a:t>
+              <a:t>Entity</a:t>
             </a:r>
             <a:r>
               <a:rPr lang="en-US" dirty="0" smtClean="0"/>
-              <a:t>" option in the dialog box</a:t>
+              <a:t>" </a:t>
+            </a:r>
+            <a:r>
+              <a:rPr lang="en-US" dirty="0" smtClean="0"/>
+              <a:t>option in the dialog box</a:t>
             </a:r>
           </a:p>
         </p:txBody>
@@ -10431,7 +10473,15 @@
             </a:pPr>
             <a:r>
               <a:rPr lang="en-US" dirty="0" smtClean="0"/>
-              <a:t>Designer will then display the available LINQ to SQL </a:t>
+              <a:t>Designer will then display the available </a:t>
+            </a:r>
+            <a:r>
+              <a:rPr lang="en-US" dirty="0" smtClean="0"/>
+              <a:t>Entity to </a:t>
+            </a:r>
+            <a:r>
+              <a:rPr lang="en-US" dirty="0" smtClean="0"/>
+              <a:t>SQL </a:t>
             </a:r>
             <a:r>
               <a:rPr lang="en-US" noProof="1" smtClean="0">
@@ -10443,11 +10493,15 @@
                 </a:solidFill>
                 <a:latin typeface="Consolas" pitchFamily="49" charset="0"/>
               </a:rPr>
-              <a:t>DataContext</a:t>
+              <a:t>ObjectContext</a:t>
             </a:r>
             <a:r>
               <a:rPr lang="en-US" dirty="0" smtClean="0"/>
-              <a:t> classes</a:t>
+              <a:t> </a:t>
+            </a:r>
+            <a:r>
+              <a:rPr lang="en-US" dirty="0" smtClean="0"/>
+              <a:t>classes</a:t>
             </a:r>
           </a:p>
           <a:p>
@@ -10497,7 +10551,7 @@
       </p:sp>
       <p:pic>
         <p:nvPicPr>
-          <p:cNvPr id="645126" name="Picture 6" descr="dataContex"/>
+          <p:cNvPr id="3074" name="Picture 2"/>
           <p:cNvPicPr>
             <a:picLocks noChangeAspect="1" noChangeArrowheads="1"/>
           </p:cNvPicPr>
@@ -10518,20 +10572,50 @@
         </p:blipFill>
         <p:spPr bwMode="auto">
           <a:xfrm>
-            <a:off x="755650" y="3357563"/>
-            <a:ext cx="3743325" cy="2584450"/>
+            <a:off x="838200" y="3357562"/>
+            <a:ext cx="3194418" cy="2584452"/>
           </a:xfrm>
-          <a:prstGeom prst="roundRect">
-            <a:avLst>
-              <a:gd name="adj" fmla="val 1914"/>
-            </a:avLst>
+          <a:prstGeom prst="rect">
+            <a:avLst/>
           </a:prstGeom>
           <a:noFill/>
+          <a:ln>
+            <a:noFill/>
+          </a:ln>
+          <a:effectLst/>
+          <a:extLst>
+            <a:ext uri="{909E8E84-426E-40DD-AFC4-6F175D3DCCD1}">
+              <a14:hiddenFill xmlns:a14="http://schemas.microsoft.com/office/drawing/2010/main">
+                <a:solidFill>
+                  <a:schemeClr val="accent1"/>
+                </a:solidFill>
+              </a14:hiddenFill>
+            </a:ext>
+            <a:ext uri="{91240B29-F687-4F45-9708-019B960494DF}">
+              <a14:hiddenLine xmlns:a14="http://schemas.microsoft.com/office/drawing/2010/main" w="9525">
+                <a:solidFill>
+                  <a:schemeClr val="tx1"/>
+                </a:solidFill>
+                <a:miter lim="800000"/>
+                <a:headEnd/>
+                <a:tailEnd/>
+              </a14:hiddenLine>
+            </a:ext>
+            <a:ext uri="{AF507438-7753-43E0-B8FC-AC1667EBCBE1}">
+              <a14:hiddenEffects xmlns:a14="http://schemas.microsoft.com/office/drawing/2010/main">
+                <a:effectLst>
+                  <a:outerShdw dist="35921" dir="2700000" algn="ctr" rotWithShape="0">
+                    <a:schemeClr val="bg2"/>
+                  </a:outerShdw>
+                </a:effectLst>
+              </a14:hiddenEffects>
+            </a:ext>
+          </a:extLst>
         </p:spPr>
       </p:pic>
       <p:pic>
         <p:nvPicPr>
-          <p:cNvPr id="645127" name="Picture 7" descr="table"/>
+          <p:cNvPr id="3075" name="Picture 3"/>
           <p:cNvPicPr>
             <a:picLocks noChangeAspect="1" noChangeArrowheads="1"/>
           </p:cNvPicPr>
@@ -10552,23 +10636,45 @@
         </p:blipFill>
         <p:spPr bwMode="auto">
           <a:xfrm>
-            <a:off x="4859338" y="3357563"/>
-            <a:ext cx="3363171" cy="2584450"/>
+            <a:off x="5111383" y="3357561"/>
+            <a:ext cx="3194417" cy="2584451"/>
           </a:xfrm>
-          <a:prstGeom prst="roundRect">
-            <a:avLst>
-              <a:gd name="adj" fmla="val 2195"/>
-            </a:avLst>
+          <a:prstGeom prst="rect">
+            <a:avLst/>
           </a:prstGeom>
           <a:noFill/>
-          <a:ln w="6350">
-            <a:solidFill>
-              <a:srgbClr val="000000"/>
-            </a:solidFill>
-            <a:miter lim="800000"/>
-            <a:headEnd/>
-            <a:tailEnd/>
+          <a:ln>
+            <a:noFill/>
           </a:ln>
+          <a:effectLst/>
+          <a:extLst>
+            <a:ext uri="{909E8E84-426E-40DD-AFC4-6F175D3DCCD1}">
+              <a14:hiddenFill xmlns:a14="http://schemas.microsoft.com/office/drawing/2010/main">
+                <a:solidFill>
+                  <a:schemeClr val="accent1"/>
+                </a:solidFill>
+              </a14:hiddenFill>
+            </a:ext>
+            <a:ext uri="{91240B29-F687-4F45-9708-019B960494DF}">
+              <a14:hiddenLine xmlns:a14="http://schemas.microsoft.com/office/drawing/2010/main" w="9525">
+                <a:solidFill>
+                  <a:schemeClr val="tx1"/>
+                </a:solidFill>
+                <a:miter lim="800000"/>
+                <a:headEnd/>
+                <a:tailEnd/>
+              </a14:hiddenLine>
+            </a:ext>
+            <a:ext uri="{AF507438-7753-43E0-B8FC-AC1667EBCBE1}">
+              <a14:hiddenEffects xmlns:a14="http://schemas.microsoft.com/office/drawing/2010/main">
+                <a:effectLst>
+                  <a:outerShdw dist="35921" dir="2700000" algn="ctr" rotWithShape="0">
+                    <a:schemeClr val="bg2"/>
+                  </a:outerShdw>
+                </a:effectLst>
+              </a14:hiddenEffects>
+            </a:ext>
+          </a:extLst>
         </p:spPr>
       </p:pic>
     </p:spTree>
@@ -10645,7 +10751,12 @@
             <p:ph idx="1"/>
           </p:nvPr>
         </p:nvSpPr>
-        <p:spPr/>
+        <p:spPr>
+          <a:xfrm>
+            <a:off x="304800" y="749537"/>
+            <a:ext cx="8686800" cy="5638800"/>
+          </a:xfrm>
+        </p:spPr>
         <p:txBody>
           <a:bodyPr/>
           <a:lstStyle/>
@@ -10784,7 +10895,7 @@
       </p:sp>
       <p:pic>
         <p:nvPicPr>
-          <p:cNvPr id="647174" name="Picture 6" descr="result"/>
+          <p:cNvPr id="4099" name="Picture 3"/>
           <p:cNvPicPr>
             <a:picLocks noChangeAspect="1" noChangeArrowheads="1"/>
           </p:cNvPicPr>
@@ -10805,28 +10916,52 @@
         </p:blipFill>
         <p:spPr bwMode="auto">
           <a:xfrm>
-            <a:off x="395288" y="1905000"/>
-            <a:ext cx="8353425" cy="1882775"/>
+            <a:off x="2270124" y="1582501"/>
+            <a:ext cx="4511676" cy="1986436"/>
           </a:xfrm>
           <a:prstGeom prst="roundRect">
             <a:avLst>
-              <a:gd name="adj" fmla="val 1827"/>
+              <a:gd name="adj" fmla="val 4520"/>
             </a:avLst>
           </a:prstGeom>
           <a:noFill/>
-          <a:ln w="6350">
-            <a:solidFill>
-              <a:srgbClr val="000000"/>
-            </a:solidFill>
-            <a:miter lim="800000"/>
-            <a:headEnd/>
-            <a:tailEnd/>
+          <a:ln>
+            <a:noFill/>
           </a:ln>
+          <a:effectLst/>
+          <a:extLst>
+            <a:ext uri="{909E8E84-426E-40DD-AFC4-6F175D3DCCD1}">
+              <a14:hiddenFill xmlns:a14="http://schemas.microsoft.com/office/drawing/2010/main">
+                <a:solidFill>
+                  <a:schemeClr val="accent1"/>
+                </a:solidFill>
+              </a14:hiddenFill>
+            </a:ext>
+            <a:ext uri="{91240B29-F687-4F45-9708-019B960494DF}">
+              <a14:hiddenLine xmlns:a14="http://schemas.microsoft.com/office/drawing/2010/main" w="9525">
+                <a:solidFill>
+                  <a:schemeClr val="tx1"/>
+                </a:solidFill>
+                <a:miter lim="800000"/>
+                <a:headEnd/>
+                <a:tailEnd/>
+              </a14:hiddenLine>
+            </a:ext>
+            <a:ext uri="{AF507438-7753-43E0-B8FC-AC1667EBCBE1}">
+              <a14:hiddenEffects xmlns:a14="http://schemas.microsoft.com/office/drawing/2010/main">
+                <a:effectLst>
+                  <a:outerShdw dist="35921" dir="2700000" algn="ctr" rotWithShape="0">
+                    <a:schemeClr val="bg2"/>
+                  </a:outerShdw>
+                </a:effectLst>
+              </a14:hiddenEffects>
+            </a:ext>
+          </a:extLst>
         </p:spPr>
       </p:pic>
       <p:pic>
         <p:nvPicPr>
-          <p:cNvPr id="647175" name="Picture 7" descr="resultBrowser"/>
+          <p:cNvPr id="4100" name="Picture 4"/>
           <p:cNvPicPr>
             <a:picLocks noChangeAspect="1" noChangeArrowheads="1"/>
           </p:cNvPicPr>
@@ -10847,23 +10982,47 @@
         </p:blipFill>
         <p:spPr bwMode="auto">
           <a:xfrm>
-            <a:off x="365125" y="4675188"/>
-            <a:ext cx="8321675" cy="1649412"/>
+            <a:off x="2270124" y="4403647"/>
+            <a:ext cx="4511676" cy="2201700"/>
           </a:xfrm>
           <a:prstGeom prst="roundRect">
             <a:avLst>
-              <a:gd name="adj" fmla="val 1827"/>
+              <a:gd name="adj" fmla="val 6284"/>
             </a:avLst>
           </a:prstGeom>
           <a:noFill/>
-          <a:ln w="6350">
-            <a:solidFill>
-              <a:srgbClr val="000000"/>
-            </a:solidFill>
-            <a:miter lim="800000"/>
-            <a:headEnd/>
-            <a:tailEnd/>
+          <a:ln>
+            <a:noFill/>
           </a:ln>
+          <a:effectLst/>
+          <a:extLst>
+            <a:ext uri="{909E8E84-426E-40DD-AFC4-6F175D3DCCD1}">
+              <a14:hiddenFill xmlns:a14="http://schemas.microsoft.com/office/drawing/2010/main">
+                <a:solidFill>
+                  <a:schemeClr val="accent1"/>
+                </a:solidFill>
+              </a14:hiddenFill>
+            </a:ext>
+            <a:ext uri="{91240B29-F687-4F45-9708-019B960494DF}">
+              <a14:hiddenLine xmlns:a14="http://schemas.microsoft.com/office/drawing/2010/main" w="9525">
+                <a:solidFill>
+                  <a:schemeClr val="tx1"/>
+                </a:solidFill>
+                <a:miter lim="800000"/>
+                <a:headEnd/>
+                <a:tailEnd/>
+              </a14:hiddenLine>
+            </a:ext>
+            <a:ext uri="{AF507438-7753-43E0-B8FC-AC1667EBCBE1}">
+              <a14:hiddenEffects xmlns:a14="http://schemas.microsoft.com/office/drawing/2010/main">
+                <a:effectLst>
+                  <a:outerShdw dist="35921" dir="2700000" algn="ctr" rotWithShape="0">
+                    <a:schemeClr val="bg2"/>
+                  </a:outerShdw>
+                </a:effectLst>
+              </a14:hiddenEffects>
+            </a:ext>
+          </a:extLst>
         </p:spPr>
       </p:pic>
     </p:spTree>
@@ -10973,8 +11132,8 @@
         </p:nvSpPr>
         <p:spPr>
           <a:xfrm>
-            <a:off x="609600" y="1066800"/>
-            <a:ext cx="7924800" cy="5324535"/>
+            <a:off x="304800" y="1265396"/>
+            <a:ext cx="8534400" cy="4678204"/>
           </a:xfrm>
           <a:prstGeom prst="rect">
             <a:avLst/>
@@ -11261,12 +11420,21 @@
             </a:r>
             <a:r>
               <a:rPr lang="en-US" noProof="1"/>
-              <a:t>DataSourceID="LinqDataSourceProducts</a:t>
+              <a:t>DataSourceID</a:t>
+            </a:r>
+            <a:r>
+              <a:rPr lang="en-US" noProof="1" smtClean="0"/>
+              <a:t>="</a:t>
+            </a:r>
+            <a:r>
+              <a:rPr lang="en-US" dirty="0" smtClean="0"/>
+              <a:t>EntityDataSourceProducts</a:t>
             </a:r>
             <a:r>
               <a:rPr lang="en-US" noProof="1" smtClean="0"/>
               <a:t>"</a:t>
             </a:r>
+            <a:endParaRPr lang="en-US" noProof="1" smtClean="0"/>
           </a:p>
           <a:p>
             <a:pPr>
@@ -11374,122 +11542,79 @@
             </a:r>
           </a:p>
           <a:p>
-            <a:pPr>
-              <a:lnSpc>
-                <a:spcPct val="110000"/>
-              </a:lnSpc>
-              <a:spcBef>
-                <a:spcPts val="1200"/>
-              </a:spcBef>
-            </a:pPr>
-            <a:r>
-              <a:rPr lang="en-US" noProof="1"/>
-              <a:t>&lt;asp:LinqDataSource ID="LinqDataSourceProducts</a:t>
-            </a:r>
             <a:r>
               <a:rPr lang="en-US" noProof="1" smtClean="0"/>
-              <a:t>"</a:t>
-            </a:r>
-          </a:p>
-          <a:p>
-            <a:pPr>
-              <a:lnSpc>
-                <a:spcPct val="110000"/>
-              </a:lnSpc>
-            </a:pPr>
+              <a:t>&lt;asp:EntityDataSource ID="EntityDataSourceProducts</a:t>
+            </a:r>
             <a:r>
               <a:rPr lang="en-US" noProof="1" smtClean="0"/>
-              <a:t>  runat</a:t>
-            </a:r>
-            <a:r>
-              <a:rPr lang="en-US" noProof="1"/>
-              <a:t>="</a:t>
+              <a:t>" </a:t>
             </a:r>
             <a:r>
               <a:rPr lang="en-US" noProof="1" smtClean="0"/>
-              <a:t>server" ContextTypeName=</a:t>
-            </a:r>
-          </a:p>
-          <a:p>
-            <a:pPr>
-              <a:lnSpc>
-                <a:spcPct val="110000"/>
-              </a:lnSpc>
-            </a:pPr>
-            <a:r>
-              <a:rPr lang="en-US" noProof="1" smtClean="0"/>
-              <a:t>  "</a:t>
-            </a:r>
-            <a:r>
-              <a:rPr lang="en-US" noProof="1"/>
-              <a:t>LinqDataSourceDemo.NorthwindDataContext</a:t>
-            </a:r>
-            <a:r>
-              <a:rPr lang="en-US" noProof="1" smtClean="0"/>
-              <a:t>"</a:t>
-            </a:r>
-          </a:p>
-          <a:p>
-            <a:pPr>
-              <a:lnSpc>
-                <a:spcPct val="110000"/>
-              </a:lnSpc>
-            </a:pPr>
+              <a:t> </a:t>
+            </a:r>
+          </a:p>
+          <a:p>
             <a:r>
               <a:rPr lang="en-US" noProof="1"/>
               <a:t> </a:t>
             </a:r>
             <a:r>
               <a:rPr lang="en-US" noProof="1" smtClean="0"/>
-              <a:t> TableName</a:t>
-            </a:r>
-            <a:r>
-              <a:rPr lang="en-US" noProof="1"/>
-              <a:t>="Products</a:t>
+              <a:t> runat</a:t>
+            </a:r>
+            <a:r>
+              <a:rPr lang="en-US" noProof="1" smtClean="0"/>
+              <a:t>="server" ConnectionString="name=NorthwindEntities" </a:t>
+            </a:r>
+          </a:p>
+          <a:p>
+            <a:r>
+              <a:rPr lang="en-US" noProof="1" smtClean="0"/>
+              <a:t> </a:t>
+            </a:r>
+            <a:r>
+              <a:rPr lang="en-US" noProof="1" smtClean="0"/>
+              <a:t> DefaultContainerName</a:t>
+            </a:r>
+            <a:r>
+              <a:rPr lang="en-US" noProof="1" smtClean="0"/>
+              <a:t>="NorthwindEntities</a:t>
             </a:r>
             <a:r>
               <a:rPr lang="en-US" noProof="1" smtClean="0"/>
               <a:t>" </a:t>
             </a:r>
             <a:r>
+              <a:rPr lang="en-US" noProof="1" smtClean="0"/>
+              <a:t> </a:t>
+            </a:r>
+          </a:p>
+          <a:p>
+            <a:r>
               <a:rPr lang="en-US" noProof="1"/>
-              <a:t>EnableDelete="True</a:t>
+              <a:t> </a:t>
             </a:r>
             <a:r>
               <a:rPr lang="en-US" noProof="1" smtClean="0"/>
-              <a:t>"</a:t>
-            </a:r>
-          </a:p>
-          <a:p>
-            <a:pPr>
-              <a:lnSpc>
-                <a:spcPct val="110000"/>
-              </a:lnSpc>
-            </a:pPr>
+              <a:t> EntitySetName</a:t>
+            </a:r>
             <a:r>
               <a:rPr lang="en-US" noProof="1" smtClean="0"/>
-              <a:t>  EnableInsert</a:t>
-            </a:r>
-            <a:r>
-              <a:rPr lang="en-US" noProof="1"/>
-              <a:t>="True" EnableUpdate="True</a:t>
-            </a:r>
+              <a:t>="Products"&gt;</a:t>
+            </a:r>
+          </a:p>
+          <a:p>
             <a:r>
               <a:rPr lang="en-US" noProof="1" smtClean="0"/>
-              <a:t>"&gt;</a:t>
+              <a:t>&lt;/</a:t>
+            </a:r>
+            <a:r>
+              <a:rPr lang="en-US" noProof="1" smtClean="0"/>
+              <a:t>asp:EntityDataSource&gt;</a:t>
             </a:r>
             <a:endParaRPr lang="en-US" noProof="1"/>
-          </a:p>
-          <a:p>
-            <a:pPr>
-              <a:lnSpc>
-                <a:spcPct val="110000"/>
-              </a:lnSpc>
-            </a:pPr>
-            <a:r>
-              <a:rPr lang="en-US" noProof="1"/>
-              <a:t>&lt;/asp:LinqDataSource&gt;</a:t>
-            </a:r>
           </a:p>
         </p:txBody>
       </p:sp>
@@ -11707,9 +11832,14 @@
               <a:t> </a:t>
             </a:r>
             <a:r>
-              <a:rPr lang="bg-BG" dirty="0"/>
-              <a:t>LinqDataSource</a:t>
-            </a:r>
+              <a:rPr lang="en-US" dirty="0" smtClean="0"/>
+              <a:t>Entity</a:t>
+            </a:r>
+            <a:r>
+              <a:rPr lang="bg-BG" dirty="0" smtClean="0"/>
+              <a:t>DataSource</a:t>
+            </a:r>
+            <a:endParaRPr lang="bg-BG" dirty="0"/>
           </a:p>
         </p:txBody>
       </p:sp>
@@ -13266,8 +13396,31 @@
                 <a:latin typeface="Consolas" pitchFamily="49" charset="0"/>
                 <a:cs typeface="Consolas" pitchFamily="49" charset="0"/>
               </a:rPr>
-              <a:t>LinqDataSource</a:t>
-            </a:r>
+              <a:t>Entity</a:t>
+            </a:r>
+            <a:r>
+              <a:rPr lang="en-US" noProof="1" smtClean="0">
+                <a:solidFill>
+                  <a:schemeClr val="accent5">
+                    <a:lumMod val="20000"/>
+                    <a:lumOff val="80000"/>
+                  </a:schemeClr>
+                </a:solidFill>
+                <a:latin typeface="Consolas" pitchFamily="49" charset="0"/>
+                <a:cs typeface="Consolas" pitchFamily="49" charset="0"/>
+              </a:rPr>
+              <a:t>DataSource</a:t>
+            </a:r>
+            <a:endParaRPr lang="en-US" noProof="1" smtClean="0">
+              <a:solidFill>
+                <a:schemeClr val="accent5">
+                  <a:lumMod val="20000"/>
+                  <a:lumOff val="80000"/>
+                </a:schemeClr>
+              </a:solidFill>
+              <a:latin typeface="Consolas" pitchFamily="49" charset="0"/>
+              <a:cs typeface="Consolas" pitchFamily="49" charset="0"/>
+            </a:endParaRPr>
           </a:p>
           <a:p>
             <a:pPr marL="712788" lvl="1" indent="-365125">
@@ -13552,7 +13705,19 @@
           <a:p>
             <a:r>
               <a:rPr lang="bg-BG" sz="3600" dirty="0"/>
-              <a:t>ObjectDataSource with LINQ-to-SQL, ListView and FormView </a:t>
+              <a:t>ObjectDataSource with </a:t>
+            </a:r>
+            <a:r>
+              <a:rPr lang="en-US" sz="3600" dirty="0" smtClean="0"/>
+              <a:t>Entities</a:t>
+            </a:r>
+            <a:r>
+              <a:rPr lang="bg-BG" sz="3600" dirty="0" smtClean="0"/>
+              <a:t>-to-SQL</a:t>
+            </a:r>
+            <a:r>
+              <a:rPr lang="bg-BG" sz="3600" dirty="0"/>
+              <a:t>, ListView and FormView </a:t>
             </a:r>
           </a:p>
         </p:txBody>
@@ -13587,7 +13752,15 @@
             </a:pPr>
             <a:r>
               <a:rPr lang="en-US" sz="3000" noProof="1" smtClean="0"/>
-              <a:t>Define the data model (LINQ to SQL)</a:t>
+              <a:t>Define the data model </a:t>
+            </a:r>
+            <a:r>
+              <a:rPr lang="en-US" sz="3000" noProof="1" smtClean="0"/>
+              <a:t>(Entities to </a:t>
+            </a:r>
+            <a:r>
+              <a:rPr lang="en-US" sz="3000" noProof="1" smtClean="0"/>
+              <a:t>SQL)</a:t>
             </a:r>
             <a:endParaRPr lang="en-US" sz="3000" dirty="0" smtClean="0"/>
           </a:p>
@@ -13762,7 +13935,126 @@
                 <a:latin typeface="Consolas" pitchFamily="49" charset="0"/>
                 <a:cs typeface="Consolas" pitchFamily="49" charset="0"/>
               </a:rPr>
-              <a:t>public static DataClassesDataContext dataContext = </a:t>
+              <a:t>public static </a:t>
+            </a:r>
+            <a:r>
+              <a:rPr lang="en-US" sz="2000" b="1" noProof="1" smtClean="0">
+                <a:solidFill>
+                  <a:srgbClr val="8CF4F2"/>
+                </a:solidFill>
+                <a:effectLst>
+                  <a:outerShdw blurRad="38100" dist="38100" dir="2700000" algn="tl">
+                    <a:srgbClr val="000000">
+                      <a:alpha val="43137"/>
+                    </a:srgbClr>
+                  </a:outerShdw>
+                </a:effectLst>
+                <a:latin typeface="Consolas" pitchFamily="49" charset="0"/>
+                <a:cs typeface="Consolas" pitchFamily="49" charset="0"/>
+              </a:rPr>
+              <a:t>Data</a:t>
+            </a:r>
+            <a:r>
+              <a:rPr lang="bg-BG" sz="2000" b="1" noProof="1" smtClean="0">
+                <a:solidFill>
+                  <a:srgbClr val="8CF4F2"/>
+                </a:solidFill>
+                <a:effectLst>
+                  <a:outerShdw blurRad="38100" dist="38100" dir="2700000" algn="tl">
+                    <a:srgbClr val="000000">
+                      <a:alpha val="43137"/>
+                    </a:srgbClr>
+                  </a:outerShdw>
+                </a:effectLst>
+                <a:latin typeface="Consolas" pitchFamily="49" charset="0"/>
+                <a:cs typeface="Consolas" pitchFamily="49" charset="0"/>
+              </a:rPr>
+              <a:t>Classes</a:t>
+            </a:r>
+            <a:r>
+              <a:rPr lang="en-US" sz="2000" b="1" noProof="1" smtClean="0">
+                <a:solidFill>
+                  <a:srgbClr val="8CF4F2"/>
+                </a:solidFill>
+                <a:effectLst>
+                  <a:outerShdw blurRad="38100" dist="38100" dir="2700000" algn="tl">
+                    <a:srgbClr val="000000">
+                      <a:alpha val="43137"/>
+                    </a:srgbClr>
+                  </a:outerShdw>
+                </a:effectLst>
+                <a:latin typeface="Consolas" pitchFamily="49" charset="0"/>
+                <a:cs typeface="Consolas" pitchFamily="49" charset="0"/>
+              </a:rPr>
+              <a:t>Object</a:t>
+            </a:r>
+            <a:r>
+              <a:rPr lang="bg-BG" sz="2000" b="1" noProof="1" smtClean="0">
+                <a:solidFill>
+                  <a:srgbClr val="8CF4F2"/>
+                </a:solidFill>
+                <a:effectLst>
+                  <a:outerShdw blurRad="38100" dist="38100" dir="2700000" algn="tl">
+                    <a:srgbClr val="000000">
+                      <a:alpha val="43137"/>
+                    </a:srgbClr>
+                  </a:outerShdw>
+                </a:effectLst>
+                <a:latin typeface="Consolas" pitchFamily="49" charset="0"/>
+                <a:cs typeface="Consolas" pitchFamily="49" charset="0"/>
+              </a:rPr>
+              <a:t>Context </a:t>
+            </a:r>
+            <a:r>
+              <a:rPr lang="en-US" sz="2000" b="1" noProof="1" smtClean="0">
+                <a:solidFill>
+                  <a:srgbClr val="8CF4F2"/>
+                </a:solidFill>
+                <a:effectLst>
+                  <a:outerShdw blurRad="38100" dist="38100" dir="2700000" algn="tl">
+                    <a:srgbClr val="000000">
+                      <a:alpha val="43137"/>
+                    </a:srgbClr>
+                  </a:outerShdw>
+                </a:effectLst>
+                <a:latin typeface="Consolas" pitchFamily="49" charset="0"/>
+                <a:cs typeface="Consolas" pitchFamily="49" charset="0"/>
+              </a:rPr>
+              <a:t>object</a:t>
+            </a:r>
+            <a:r>
+              <a:rPr lang="bg-BG" sz="2000" b="1" noProof="1" smtClean="0">
+                <a:solidFill>
+                  <a:srgbClr val="8CF4F2"/>
+                </a:solidFill>
+                <a:effectLst>
+                  <a:outerShdw blurRad="38100" dist="38100" dir="2700000" algn="tl">
+                    <a:srgbClr val="000000">
+                      <a:alpha val="43137"/>
+                    </a:srgbClr>
+                  </a:outerShdw>
+                </a:effectLst>
+                <a:latin typeface="Consolas" pitchFamily="49" charset="0"/>
+                <a:cs typeface="Consolas" pitchFamily="49" charset="0"/>
+              </a:rPr>
+              <a:t>Context </a:t>
+            </a:r>
+            <a:r>
+              <a:rPr lang="bg-BG" sz="2000" b="1" noProof="1" smtClean="0">
+                <a:solidFill>
+                  <a:srgbClr val="8CF4F2"/>
+                </a:solidFill>
+                <a:effectLst>
+                  <a:outerShdw blurRad="38100" dist="38100" dir="2700000" algn="tl">
+                    <a:srgbClr val="000000">
+                      <a:alpha val="43137"/>
+                    </a:srgbClr>
+                  </a:outerShdw>
+                </a:effectLst>
+                <a:latin typeface="Consolas" pitchFamily="49" charset="0"/>
+                <a:cs typeface="Consolas" pitchFamily="49" charset="0"/>
+              </a:rPr>
+              <a:t>= </a:t>
             </a:r>
             <a:endParaRPr lang="en-US" sz="2000" b="1" noProof="1" smtClean="0">
               <a:solidFill>
@@ -13841,7 +14133,75 @@
                 <a:latin typeface="Consolas" pitchFamily="49" charset="0"/>
                 <a:cs typeface="Consolas" pitchFamily="49" charset="0"/>
               </a:rPr>
-              <a:t>new DataClassesDataContext();</a:t>
+              <a:t>new </a:t>
+            </a:r>
+            <a:r>
+              <a:rPr lang="bg-BG" sz="2000" b="1" noProof="1" smtClean="0">
+                <a:solidFill>
+                  <a:srgbClr val="8CF4F2"/>
+                </a:solidFill>
+                <a:effectLst>
+                  <a:outerShdw blurRad="38100" dist="38100" dir="2700000" algn="tl">
+                    <a:srgbClr val="000000">
+                      <a:alpha val="43137"/>
+                    </a:srgbClr>
+                  </a:outerShdw>
+                </a:effectLst>
+                <a:latin typeface="Consolas" pitchFamily="49" charset="0"/>
+                <a:cs typeface="Consolas" pitchFamily="49" charset="0"/>
+              </a:rPr>
+              <a:t>DataClasses</a:t>
+            </a:r>
+            <a:r>
+              <a:rPr lang="en-US" sz="2000" b="1" noProof="1" smtClean="0">
+                <a:solidFill>
+                  <a:srgbClr val="8CF4F2"/>
+                </a:solidFill>
+                <a:effectLst>
+                  <a:outerShdw blurRad="38100" dist="38100" dir="2700000" algn="tl">
+                    <a:srgbClr val="000000">
+                      <a:alpha val="43137"/>
+                    </a:srgbClr>
+                  </a:outerShdw>
+                </a:effectLst>
+                <a:latin typeface="Consolas" pitchFamily="49" charset="0"/>
+                <a:cs typeface="Consolas" pitchFamily="49" charset="0"/>
+              </a:rPr>
+              <a:t>Object</a:t>
+            </a:r>
+            <a:r>
+              <a:rPr lang="bg-BG" sz="2000" b="1" noProof="1" smtClean="0">
+                <a:solidFill>
+                  <a:srgbClr val="8CF4F2"/>
+                </a:solidFill>
+                <a:effectLst>
+                  <a:outerShdw blurRad="38100" dist="38100" dir="2700000" algn="tl">
+                    <a:srgbClr val="000000">
+                      <a:alpha val="43137"/>
+                    </a:srgbClr>
+                  </a:outerShdw>
+                </a:effectLst>
+                <a:latin typeface="Consolas" pitchFamily="49" charset="0"/>
+                <a:cs typeface="Consolas" pitchFamily="49" charset="0"/>
+              </a:rPr>
+              <a:t>Context</a:t>
+            </a:r>
+            <a:r>
+              <a:rPr lang="bg-BG" sz="2000" b="1" noProof="1" smtClean="0">
+                <a:solidFill>
+                  <a:srgbClr val="8CF4F2"/>
+                </a:solidFill>
+                <a:effectLst>
+                  <a:outerShdw blurRad="38100" dist="38100" dir="2700000" algn="tl">
+                    <a:srgbClr val="000000">
+                      <a:alpha val="43137"/>
+                    </a:srgbClr>
+                  </a:outerShdw>
+                </a:effectLst>
+                <a:latin typeface="Consolas" pitchFamily="49" charset="0"/>
+                <a:cs typeface="Consolas" pitchFamily="49" charset="0"/>
+              </a:rPr>
+              <a:t>();</a:t>
             </a:r>
           </a:p>
           <a:p>
@@ -17222,7 +17582,19 @@
                 </a:solidFill>
                 <a:latin typeface="Consolas" pitchFamily="49" charset="0"/>
               </a:rPr>
-              <a:t>LinqDataSource</a:t>
+              <a:t>Entity</a:t>
+            </a:r>
+            <a:r>
+              <a:rPr lang="en-US" noProof="1" smtClean="0">
+                <a:solidFill>
+                  <a:schemeClr val="accent5">
+                    <a:lumMod val="20000"/>
+                    <a:lumOff val="80000"/>
+                  </a:schemeClr>
+                </a:solidFill>
+                <a:latin typeface="Consolas" pitchFamily="49" charset="0"/>
+              </a:rPr>
+              <a:t>DataSource</a:t>
             </a:r>
             <a:r>
               <a:rPr lang="en-US" noProof="1"/>
@@ -17417,7 +17789,7 @@
               </a:lnSpc>
             </a:pPr>
             <a:r>
-              <a:rPr lang="en-US" noProof="1">
+              <a:rPr lang="en-US" noProof="1" smtClean="0">
                 <a:solidFill>
                   <a:schemeClr val="accent5">
                     <a:lumMod val="20000"/>
@@ -17426,10 +17798,10 @@
                 </a:solidFill>
                 <a:latin typeface="Consolas" pitchFamily="49" charset="0"/>
               </a:rPr>
-              <a:t>LinqDataSource</a:t>
-            </a:r>
-            <a:r>
-              <a:rPr lang="en-US" dirty="0"/>
+              <a:t>EntityDataSource</a:t>
+            </a:r>
+            <a:r>
+              <a:rPr lang="en-US" dirty="0" smtClean="0"/>
               <a:t> </a:t>
             </a:r>
             <a:r>
@@ -18095,13 +18467,7 @@
               <a:rPr lang="en-US" noProof="1" smtClean="0">
                 <a:sym typeface="Wingdings" pitchFamily="2" charset="2"/>
               </a:rPr>
-              <a:t> </a:t>
-            </a:r>
-            <a:r>
-              <a:rPr lang="en-US" noProof="1" smtClean="0">
-                <a:sym typeface="Wingdings" pitchFamily="2" charset="2"/>
-              </a:rPr>
-              <a:t>use </a:t>
+              <a:t> use </a:t>
             </a:r>
             <a:r>
               <a:rPr lang="en-US" noProof="1" smtClean="0">
@@ -18473,11 +18839,15 @@
                 </a:solidFill>
                 <a:latin typeface="Consolas" pitchFamily="49" charset="0"/>
               </a:rPr>
-              <a:t>LinqDataSource</a:t>
+              <a:t>EntityDataSource</a:t>
             </a:r>
             <a:r>
               <a:rPr lang="en-US" dirty="0" smtClean="0"/>
-              <a:t> is designed to bind against a LINQ-enabled data model</a:t>
+              <a:t> </a:t>
+            </a:r>
+            <a:r>
+              <a:rPr lang="en-US" dirty="0" smtClean="0"/>
+              <a:t>is designed to bind against a LINQ-enabled data model</a:t>
             </a:r>
           </a:p>
           <a:p>
@@ -18499,7 +18869,15 @@
             </a:pPr>
             <a:r>
               <a:rPr lang="en-US" dirty="0" smtClean="0"/>
-              <a:t>Database data (e.g. LINQ to SQL query)</a:t>
+              <a:t>Database data (e.g. </a:t>
+            </a:r>
+            <a:r>
+              <a:rPr lang="en-US" dirty="0" smtClean="0"/>
+              <a:t>Entity to SQL </a:t>
+            </a:r>
+            <a:r>
+              <a:rPr lang="en-US" dirty="0" smtClean="0"/>
+              <a:t>query)</a:t>
             </a:r>
           </a:p>
           <a:p>
@@ -18549,11 +18927,15 @@
                 </a:solidFill>
                 <a:latin typeface="Consolas" pitchFamily="49" charset="0"/>
               </a:rPr>
-              <a:t>LinqDataSource</a:t>
+              <a:t>EntityDataSource</a:t>
             </a:r>
             <a:r>
               <a:rPr lang="en-US" dirty="0" smtClean="0"/>
-              <a:t> to any kind of data collection that is stored in a public field or property</a:t>
+              <a:t> </a:t>
+            </a:r>
+            <a:r>
+              <a:rPr lang="en-US" dirty="0" smtClean="0"/>
+              <a:t>to any kind of data collection that is stored in a public field or property</a:t>
             </a:r>
           </a:p>
         </p:txBody>
@@ -18719,11 +19101,27 @@
                 </a:solidFill>
                 <a:latin typeface="Consolas" pitchFamily="49" charset="0"/>
               </a:rPr>
-              <a:t>LinqDataSource</a:t>
+              <a:t>Entity</a:t>
+            </a:r>
+            <a:r>
+              <a:rPr lang="en-US" noProof="1" smtClean="0">
+                <a:solidFill>
+                  <a:schemeClr val="accent5">
+                    <a:lumMod val="20000"/>
+                    <a:lumOff val="80000"/>
+                  </a:schemeClr>
+                </a:solidFill>
+                <a:latin typeface="Consolas" pitchFamily="49" charset="0"/>
+              </a:rPr>
+              <a:t>DataSource</a:t>
             </a:r>
             <a:r>
               <a:rPr lang="en-US" dirty="0" smtClean="0"/>
-              <a:t> automatically creates the commands for interacting with the data</a:t>
+              <a:t> </a:t>
+            </a:r>
+            <a:r>
+              <a:rPr lang="en-US" dirty="0" smtClean="0"/>
+              <a:t>automatically creates the commands for interacting with the data</a:t>
             </a:r>
           </a:p>
         </p:txBody>
@@ -18757,72 +19155,6 @@
           </a:p>
         </p:txBody>
       </p:sp>
-      <p:pic>
-        <p:nvPicPr>
-          <p:cNvPr id="1026" name="Picture 2"/>
-          <p:cNvPicPr>
-            <a:picLocks noChangeAspect="1" noChangeArrowheads="1"/>
-          </p:cNvPicPr>
-          <p:nvPr/>
-        </p:nvPicPr>
-        <p:blipFill>
-          <a:blip r:embed="rId3">
-            <a:extLst>
-              <a:ext uri="{28A0092B-C50C-407E-A947-70E740481C1C}">
-                <a14:useLocalDpi xmlns:a14="http://schemas.microsoft.com/office/drawing/2010/main" val="0"/>
-              </a:ext>
-            </a:extLst>
-          </a:blip>
-          <a:srcRect/>
-          <a:stretch>
-            <a:fillRect/>
-          </a:stretch>
-        </p:blipFill>
-        <p:spPr bwMode="auto">
-          <a:xfrm>
-            <a:off x="5600700" y="4277833"/>
-            <a:ext cx="2857500" cy="2137833"/>
-          </a:xfrm>
-          <a:prstGeom prst="roundRect">
-            <a:avLst>
-              <a:gd name="adj" fmla="val 8416"/>
-            </a:avLst>
-          </a:prstGeom>
-          <a:noFill/>
-          <a:ln>
-            <a:noFill/>
-          </a:ln>
-          <a:effectLst/>
-          <a:extLst>
-            <a:ext uri="{909E8E84-426E-40DD-AFC4-6F175D3DCCD1}">
-              <a14:hiddenFill xmlns:a14="http://schemas.microsoft.com/office/drawing/2010/main">
-                <a:solidFill>
-                  <a:schemeClr val="accent1"/>
-                </a:solidFill>
-              </a14:hiddenFill>
-            </a:ext>
-            <a:ext uri="{91240B29-F687-4F45-9708-019B960494DF}">
-              <a14:hiddenLine xmlns:a14="http://schemas.microsoft.com/office/drawing/2010/main" w="9525">
-                <a:solidFill>
-                  <a:schemeClr val="tx1"/>
-                </a:solidFill>
-                <a:miter lim="800000"/>
-                <a:headEnd/>
-                <a:tailEnd/>
-              </a14:hiddenLine>
-            </a:ext>
-            <a:ext uri="{AF507438-7753-43E0-B8FC-AC1667EBCBE1}">
-              <a14:hiddenEffects xmlns:a14="http://schemas.microsoft.com/office/drawing/2010/main">
-                <a:effectLst>
-                  <a:outerShdw dist="35921" dir="2700000" algn="ctr" rotWithShape="0">
-                    <a:schemeClr val="bg2"/>
-                  </a:outerShdw>
-                </a:effectLst>
-              </a14:hiddenEffects>
-            </a:ext>
-          </a:extLst>
-        </p:spPr>
-      </p:pic>
       <p:grpSp>
         <p:nvGrpSpPr>
           <p:cNvPr id="2" name="Group 1"/>
@@ -18879,7 +19211,7 @@
               <a:pPr algn="ctr">
                 <a:defRPr/>
               </a:pPr>
-              <a:endParaRPr lang="en-US" sz="2000" b="1">
+              <a:endParaRPr lang="en-US" sz="2000" b="1" dirty="0">
                 <a:solidFill>
                   <a:schemeClr val="tx1">
                     <a:lumMod val="40000"/>
@@ -18963,7 +19295,7 @@
                 <a:pPr>
                   <a:defRPr/>
                 </a:pPr>
-                <a:endParaRPr lang="en-US" b="1">
+                <a:endParaRPr lang="en-US" b="1" dirty="0">
                   <a:solidFill>
                     <a:schemeClr val="accent5">
                       <a:lumMod val="20000"/>
@@ -19025,7 +19357,7 @@
                 <a:pPr>
                   <a:defRPr/>
                 </a:pPr>
-                <a:endParaRPr lang="en-US" b="1">
+                <a:endParaRPr lang="en-US" b="1" dirty="0">
                   <a:solidFill>
                     <a:schemeClr val="accent5">
                       <a:lumMod val="20000"/>
@@ -19087,7 +19419,7 @@
                 <a:pPr>
                   <a:defRPr/>
                 </a:pPr>
-                <a:endParaRPr lang="en-US" b="1">
+                <a:endParaRPr lang="en-US" b="1" dirty="0">
                   <a:solidFill>
                     <a:schemeClr val="accent5">
                       <a:lumMod val="20000"/>
@@ -19586,7 +19918,7 @@
                 <a:pPr algn="ctr">
                   <a:defRPr/>
                 </a:pPr>
-                <a:endParaRPr lang="en-US" sz="2000" b="1">
+                <a:endParaRPr lang="en-US" sz="2000" b="1" dirty="0">
                   <a:solidFill>
                     <a:schemeClr val="tx1">
                       <a:lumMod val="40000"/>
@@ -19649,7 +19981,7 @@
                 <a:pPr algn="ctr">
                   <a:defRPr/>
                 </a:pPr>
-                <a:endParaRPr lang="en-US" sz="2000" b="1">
+                <a:endParaRPr lang="en-US" sz="2000" b="1" dirty="0">
                   <a:solidFill>
                     <a:schemeClr val="tx1">
                       <a:lumMod val="40000"/>
@@ -19712,7 +20044,7 @@
                 <a:pPr algn="ctr">
                   <a:defRPr/>
                 </a:pPr>
-                <a:endParaRPr lang="en-US" sz="2000" b="1">
+                <a:endParaRPr lang="en-US" sz="2000" b="1" dirty="0">
                   <a:solidFill>
                     <a:schemeClr val="tx1">
                       <a:lumMod val="40000"/>
@@ -19781,6 +20113,57 @@
           </p:txBody>
         </p:sp>
       </p:grpSp>
+      <p:pic>
+        <p:nvPicPr>
+          <p:cNvPr id="3" name="Picture 2" descr="http://www.scip.be/ImagesLogos/Small/Article_EntityFramework.jpg"/>
+          <p:cNvPicPr>
+            <a:picLocks noChangeAspect="1" noChangeArrowheads="1"/>
+          </p:cNvPicPr>
+          <p:nvPr/>
+        </p:nvPicPr>
+        <p:blipFill>
+          <a:blip r:embed="rId3">
+            <a:extLst>
+              <a:ext uri="{28A0092B-C50C-407E-A947-70E740481C1C}">
+                <a14:useLocalDpi xmlns:a14="http://schemas.microsoft.com/office/drawing/2010/main" val="0"/>
+              </a:ext>
+            </a:extLst>
+          </a:blip>
+          <a:srcRect/>
+          <a:stretch>
+            <a:fillRect/>
+          </a:stretch>
+        </p:blipFill>
+        <p:spPr bwMode="auto">
+          <a:xfrm>
+            <a:off x="5791200" y="4278120"/>
+            <a:ext cx="2842902" cy="2126912"/>
+          </a:xfrm>
+          <a:prstGeom prst="roundRect">
+            <a:avLst>
+              <a:gd name="adj" fmla="val 12573"/>
+            </a:avLst>
+          </a:prstGeom>
+          <a:noFill/>
+          <a:effectLst>
+            <a:glow rad="101600">
+              <a:schemeClr val="accent4">
+                <a:satMod val="175000"/>
+                <a:alpha val="40000"/>
+              </a:schemeClr>
+            </a:glow>
+          </a:effectLst>
+          <a:extLst>
+            <a:ext uri="{909E8E84-426E-40DD-AFC4-6F175D3DCCD1}">
+              <a14:hiddenFill xmlns:a14="http://schemas.microsoft.com/office/drawing/2010/main">
+                <a:solidFill>
+                  <a:srgbClr val="FFFFFF"/>
+                </a:solidFill>
+              </a14:hiddenFill>
+            </a:ext>
+          </a:extLst>
+        </p:spPr>
+      </p:pic>
     </p:spTree>
   </p:cSld>
   <p:clrMapOvr>

</xml_diff>

<commit_message>
Small fixes in the lectures (formatting)
</commit_message>
<xml_diff>
--- a/2010/lectures/10. ASP.NET-and-Databases.pptx
+++ b/2010/lectures/10. ASP.NET-and-Databases.pptx
@@ -286,7 +286,7 @@
             <a:fld id="{3BF7C7B5-275F-4D1F-9AB4-9255447DBC73}" type="datetimeFigureOut">
               <a:rPr lang="en-US"/>
               <a:pPr/>
-              <a:t>12/12/2010</a:t>
+              <a:t>20-Dec-10</a:t>
             </a:fld>
             <a:endParaRPr lang="en-US" dirty="0"/>
           </a:p>
@@ -517,7 +517,7 @@
             <a:fld id="{9B46F231-FB2B-4655-A644-E2477325E686}" type="datetimeFigureOut">
               <a:rPr lang="en-US"/>
               <a:pPr/>
-              <a:t>12/12/2010</a:t>
+              <a:t>20-Dec-10</a:t>
             </a:fld>
             <a:endParaRPr lang="en-US" dirty="0"/>
           </a:p>
@@ -1419,11 +1419,7 @@
             </a:pPr>
             <a:r>
               <a:rPr lang="en-US" dirty="0" smtClean="0"/>
-              <a:t>1) </a:t>
-            </a:r>
-            <a:r>
-              <a:rPr lang="en-US" dirty="0" smtClean="0"/>
-              <a:t>Represents a business object that provides data to data-bound controls in multitier Web application architectures.</a:t>
+              <a:t>1) Represents a business object that provides data to data-bound controls in multitier Web application architectures.</a:t>
             </a:r>
           </a:p>
           <a:p>
@@ -1446,19 +1442,7 @@
             </a:pPr>
             <a:r>
               <a:rPr lang="en-US" dirty="0" smtClean="0"/>
-              <a:t>2) </a:t>
-            </a:r>
-            <a:r>
-              <a:rPr lang="en-US" dirty="0" smtClean="0"/>
-              <a:t>A very common application design practice is to separate the presentation layer from business logic and to encapsulate the business logic in business objects. These business objects form a distinct layer between the presentation layer and the data tier, resulting in a three-tier application architecture. The </a:t>
-            </a:r>
-            <a:r>
-              <a:rPr lang="en-US" dirty="0" err="1" smtClean="0"/>
-              <a:t>ObjectDataSource</a:t>
-            </a:r>
-            <a:r>
-              <a:rPr lang="en-US" dirty="0" smtClean="0"/>
-              <a:t> control enables developers to use an ASP.NET data source control while retaining their three-tier application architecture.</a:t>
+              <a:t>2) A very common application design practice is to separate the presentation layer from business logic and to encapsulate the business logic in business objects. These business objects form a distinct layer between the presentation layer and the data tier, resulting in a three-tier application architecture. The ObjectDataSource control enables developers to use an ASP.NET data source control while retaining their three-tier application architecture.</a:t>
             </a:r>
           </a:p>
           <a:p>
@@ -1472,29 +1456,13 @@
             </a:r>
             <a:r>
               <a:rPr lang="en-US" dirty="0" smtClean="0"/>
-              <a:t>The </a:t>
-            </a:r>
-            <a:r>
-              <a:rPr lang="en-US" dirty="0" err="1" smtClean="0"/>
-              <a:t>ObjectDataSource</a:t>
-            </a:r>
+              <a:t>The ObjectDataSource control creates and destroys an instance of the class for each method call; it does not hold the object in memory for the lifetime of the Web request. This is a serious consideration if the business object that you use requires many resources or is otherwise expensive to create and destroy</a:t>
+            </a:r>
+          </a:p>
+          <a:p>
             <a:r>
               <a:rPr lang="en-US" dirty="0" smtClean="0"/>
-              <a:t> control creates and destroys an instance of the class for each method call; it does not hold the object in memory for the lifetime of the Web request. This is a serious consideration if the business object that you use requires many resources or is otherwise expensive to create and destroy</a:t>
-            </a:r>
-          </a:p>
-          <a:p>
-            <a:r>
-              <a:rPr lang="en-US" dirty="0" smtClean="0"/>
-              <a:t>4 )Although the </a:t>
-            </a:r>
-            <a:r>
-              <a:rPr lang="en-US" dirty="0" err="1" smtClean="0"/>
-              <a:t>ObjectDataSource</a:t>
-            </a:r>
-            <a:r>
-              <a:rPr lang="en-US" dirty="0" smtClean="0"/>
-              <a:t> does not retain the instance of the business object across multiple requests, it can cache the result of the </a:t>
+              <a:t>4 )Although the ObjectDataSource does not retain the instance of the business object across multiple requests, it can cache the result of the </a:t>
             </a:r>
             <a:r>
               <a:rPr lang="en-US" dirty="0" err="1" smtClean="0">
@@ -2499,11 +2467,7 @@
             </a:r>
             <a:r>
               <a:rPr lang="en-US" dirty="0" smtClean="0"/>
-              <a:t>: </a:t>
-            </a:r>
-            <a:r>
-              <a:rPr lang="en-US" dirty="0" smtClean="0"/>
-              <a:t>Enables you to use Language-Integrated Query (LINQ) in an ASP.NET Web page through declarative markup in order to retrieve and modify data from a data object. Supports automatic generation of select, update, insert, and delete commands. The control also supports sorting, filtering, and paging.</a:t>
+              <a:t>: Enables you to use Language-Integrated Query (LINQ) in an ASP.NET Web page through declarative markup in order to retrieve and modify data from a data object. Supports automatic generation of select, update, insert, and delete commands. The control also supports sorting, filtering, and paging.</a:t>
             </a:r>
           </a:p>
           <a:p>
@@ -2625,11 +2589,7 @@
             </a:pPr>
             <a:r>
               <a:rPr lang="en-US" dirty="0" smtClean="0"/>
-              <a:t>4) </a:t>
-            </a:r>
-            <a:r>
-              <a:rPr lang="en-US" dirty="0" smtClean="0"/>
-              <a:t>Enables you to work with a Microsoft Access database. Supports sorting, filtering, and paging when data is returned as a </a:t>
+              <a:t>4) Enables you to work with a Microsoft Access database. Supports sorting, filtering, and paging when data is returned as a </a:t>
             </a:r>
             <a:r>
               <a:rPr lang="en-US" dirty="0" err="1" smtClean="0">
@@ -3513,11 +3473,7 @@
             </a:pPr>
             <a:r>
               <a:rPr lang="en-US" dirty="0" smtClean="0"/>
-              <a:t>2) </a:t>
-            </a:r>
-            <a:r>
-              <a:rPr lang="en-US" dirty="0" smtClean="0"/>
-              <a:t>Model and manipulate data at a level of structure and semantics that is closer to the business domain</a:t>
+              <a:t>2) Model and manipulate data at a level of structure and semantics that is closer to the business domain</a:t>
             </a:r>
           </a:p>
           <a:p>
@@ -9051,8 +9007,8 @@
         </p:nvSpPr>
         <p:spPr>
           <a:xfrm>
-            <a:off x="457200" y="5224046"/>
-            <a:ext cx="3352800" cy="954107"/>
+            <a:off x="457200" y="5568315"/>
+            <a:ext cx="3352800" cy="496907"/>
           </a:xfrm>
         </p:spPr>
         <p:txBody>
@@ -9082,7 +9038,7 @@
         </p:nvSpPr>
         <p:spPr>
           <a:xfrm>
-            <a:off x="457200" y="5757446"/>
+            <a:off x="457200" y="6031468"/>
             <a:ext cx="1633781" cy="369332"/>
           </a:xfrm>
         </p:spPr>
@@ -9196,7 +9152,7 @@
         </p:blipFill>
         <p:spPr bwMode="auto">
           <a:xfrm rot="21177485">
-            <a:off x="2951235" y="4288669"/>
+            <a:off x="2798835" y="4403566"/>
             <a:ext cx="2705090" cy="1074067"/>
           </a:xfrm>
           <a:prstGeom prst="roundRect">
@@ -9390,17 +9346,16 @@
               </a:rPr>
               <a:t>EntityDataSource</a:t>
             </a:r>
+          </a:p>
+          <a:p>
+            <a:pPr lvl="1">
+              <a:lnSpc>
+                <a:spcPct val="100000"/>
+              </a:lnSpc>
+            </a:pPr>
             <a:r>
               <a:rPr lang="en-US" dirty="0" smtClean="0"/>
-              <a:t> </a:t>
-            </a:r>
-            <a:r>
-              <a:rPr lang="en-US" dirty="0" smtClean="0"/>
-              <a:t>- </a:t>
-            </a:r>
-            <a:r>
-              <a:rPr lang="en-US" dirty="0" smtClean="0"/>
-              <a:t>data </a:t>
+              <a:t>Provides data </a:t>
             </a:r>
             <a:r>
               <a:rPr lang="en-US" dirty="0"/>
@@ -9418,7 +9373,6 @@
               <a:rPr lang="en-US" dirty="0" smtClean="0"/>
               <a:t>EF</a:t>
             </a:r>
-            <a:endParaRPr lang="en-US" dirty="0" smtClean="0"/>
           </a:p>
           <a:p>
             <a:pPr>
@@ -9553,6 +9507,10 @@
           </p:nvPr>
         </p:nvSpPr>
         <p:spPr>
+          <a:xfrm>
+            <a:off x="1905000" y="152400"/>
+            <a:ext cx="7086600" cy="914400"/>
+          </a:xfrm>
           <a:prstGeom prst="rect">
             <a:avLst/>
           </a:prstGeom>
@@ -9563,11 +9521,18 @@
           <a:p>
             <a:r>
               <a:rPr lang="en-US" noProof="1" smtClean="0"/>
-              <a:t>EntityDataSource</a:t>
-            </a:r>
+              <a:t>EntityDataSource –</a:t>
+            </a:r>
+            <a:br>
+              <a:rPr lang="en-US" noProof="1" smtClean="0"/>
+            </a:br>
             <a:r>
               <a:rPr lang="en-US" dirty="0" smtClean="0"/>
-              <a:t> Pros And Cons</a:t>
+              <a:t>Pros </a:t>
+            </a:r>
+            <a:r>
+              <a:rPr lang="en-US" dirty="0" smtClean="0"/>
+              <a:t>And Cons</a:t>
             </a:r>
             <a:endParaRPr lang="bg-BG" dirty="0"/>
           </a:p>
@@ -9665,7 +9630,6 @@
               <a:rPr lang="en-US" dirty="0" smtClean="0"/>
               <a:t>model</a:t>
             </a:r>
-            <a:endParaRPr lang="en-US" dirty="0" smtClean="0"/>
           </a:p>
         </p:txBody>
       </p:sp>
@@ -9756,11 +9720,7 @@
             </a:r>
             <a:r>
               <a:rPr lang="en-US" dirty="0" smtClean="0"/>
-              <a:t> </a:t>
-            </a:r>
-            <a:r>
-              <a:rPr lang="en-US" dirty="0" smtClean="0"/>
-              <a:t>– Example</a:t>
+              <a:t> – Example</a:t>
             </a:r>
             <a:endParaRPr lang="bg-BG" dirty="0"/>
           </a:p>
@@ -9796,13 +9756,8 @@
             </a:pPr>
             <a:r>
               <a:rPr lang="en-US" dirty="0" smtClean="0"/>
-              <a:t>Define the data model (e.g. Entity </a:t>
-            </a:r>
-            <a:r>
-              <a:rPr lang="en-US" dirty="0" smtClean="0"/>
-              <a:t>Data Model)</a:t>
-            </a:r>
-            <a:endParaRPr lang="en-US" dirty="0" smtClean="0"/>
+              <a:t>Define the data model (e.g. Entity Data Model)</a:t>
+            </a:r>
           </a:p>
           <a:p>
             <a:pPr marL="361950" indent="-361950">
@@ -9862,15 +9817,7 @@
             </a:pPr>
             <a:r>
               <a:rPr lang="en-US" dirty="0" smtClean="0"/>
-              <a:t>Create a basic </a:t>
-            </a:r>
-            <a:r>
-              <a:rPr lang="en-US" dirty="0" smtClean="0"/>
-              <a:t>listing </a:t>
-            </a:r>
-            <a:r>
-              <a:rPr lang="en-US" dirty="0" smtClean="0"/>
-              <a:t>(e.g. </a:t>
+              <a:t>Create a basic listing (e.g. </a:t>
             </a:r>
             <a:r>
               <a:rPr lang="en-US" noProof="1" smtClean="0">
@@ -10162,20 +10109,6 @@
               </a:rPr>
               <a:t>&gt;</a:t>
             </a:r>
-            <a:endParaRPr lang="bg-BG" sz="2000" b="1" noProof="1" smtClean="0">
-              <a:solidFill>
-                <a:srgbClr val="8CF4F2"/>
-              </a:solidFill>
-              <a:effectLst>
-                <a:outerShdw blurRad="38100" dist="38100" dir="2700000" algn="tl">
-                  <a:srgbClr val="000000">
-                    <a:alpha val="43137"/>
-                  </a:srgbClr>
-                </a:outerShdw>
-              </a:effectLst>
-              <a:latin typeface="Consolas" pitchFamily="49" charset="0"/>
-              <a:cs typeface="Consolas" pitchFamily="49" charset="0"/>
-            </a:endParaRPr>
           </a:p>
         </p:txBody>
       </p:sp>
@@ -10563,7 +10496,7 @@
         </p:nvSpPr>
         <p:spPr>
           <a:xfrm>
-            <a:off x="3956248" y="4799289"/>
+            <a:off x="3924300" y="4811989"/>
             <a:ext cx="372622" cy="510906"/>
           </a:xfrm>
           <a:custGeom>
@@ -11955,11 +11888,7 @@
             </a:r>
             <a:r>
               <a:rPr lang="en-US" dirty="0" smtClean="0"/>
-              <a:t>-</a:t>
-            </a:r>
-            <a:r>
-              <a:rPr lang="en-US" dirty="0" smtClean="0"/>
-              <a:t>Example </a:t>
+              <a:t>-Example </a:t>
             </a:r>
             <a:r>
               <a:rPr lang="en-US" dirty="0"/>
@@ -11994,13 +11923,8 @@
             </a:pPr>
             <a:r>
               <a:rPr lang="en-US" dirty="0" smtClean="0"/>
-              <a:t>Designer will then display the available Entity </a:t>
-            </a:r>
-            <a:r>
-              <a:rPr lang="en-US" dirty="0" smtClean="0"/>
-              <a:t>Containers</a:t>
-            </a:r>
-            <a:endParaRPr lang="en-US" dirty="0" smtClean="0"/>
+              <a:t>Designer will then display the available Entity Containers</a:t>
+            </a:r>
           </a:p>
           <a:p>
             <a:pPr marL="0" indent="0">
@@ -12069,8 +11993,10 @@
             <a:off x="1905000" y="2286000"/>
             <a:ext cx="5184711" cy="4195762"/>
           </a:xfrm>
-          <a:prstGeom prst="rect">
-            <a:avLst/>
+          <a:prstGeom prst="roundRect">
+            <a:avLst>
+              <a:gd name="adj" fmla="val 1533"/>
+            </a:avLst>
           </a:prstGeom>
           <a:noFill/>
           <a:ln>
@@ -13377,7 +13303,13 @@
           <p:nvPr/>
         </p:nvPicPr>
         <p:blipFill>
-          <a:blip r:embed="rId4" cstate="screen"/>
+          <a:blip r:embed="rId4" cstate="screen">
+            <a:extLst>
+              <a:ext uri="{28A0092B-C50C-407E-A947-70E740481C1C}">
+                <a14:useLocalDpi xmlns:a14="http://schemas.microsoft.com/office/drawing/2010/main" val="0"/>
+              </a:ext>
+            </a:extLst>
+          </a:blip>
           <a:srcRect/>
           <a:stretch>
             <a:fillRect/>
@@ -13448,21 +13380,10 @@
           <a:lstStyle/>
           <a:p>
             <a:r>
-              <a:rPr lang="bg-BG" sz="3600" dirty="0"/>
-              <a:t>ObjectDataSource with </a:t>
-            </a:r>
-            <a:r>
               <a:rPr lang="en-US" sz="3600" dirty="0" smtClean="0"/>
-              <a:t>Entities</a:t>
-            </a:r>
-            <a:r>
-              <a:rPr lang="bg-BG" sz="3600" dirty="0" smtClean="0"/>
-              <a:t>-to-SQL</a:t>
-            </a:r>
-            <a:r>
-              <a:rPr lang="bg-BG" sz="3600" dirty="0"/>
-              <a:t>, ListView and FormView </a:t>
-            </a:r>
+              <a:t>ObjectDataSource with EF, ListView and FormView </a:t>
+            </a:r>
+            <a:endParaRPr lang="en-US" sz="3600" dirty="0"/>
           </a:p>
         </p:txBody>
       </p:sp>
@@ -14554,13 +14475,8 @@
             </a:pPr>
             <a:r>
               <a:rPr lang="en-US" dirty="0" smtClean="0"/>
-              <a:t>ASP.NET Data </a:t>
-            </a:r>
-            <a:r>
-              <a:rPr lang="en-US" dirty="0" smtClean="0"/>
-              <a:t>Source Controls</a:t>
-            </a:r>
-            <a:endParaRPr lang="en-US" dirty="0" smtClean="0"/>
+              <a:t>ASP.NET Data Source Controls</a:t>
+            </a:r>
           </a:p>
           <a:p>
             <a:pPr marL="712788" lvl="1" indent="-365125">
@@ -14635,7 +14551,6 @@
               <a:rPr lang="en-US" dirty="0" smtClean="0"/>
               <a:t>Entity Data Model and ADO.NET Entity Framework</a:t>
             </a:r>
-            <a:endParaRPr lang="en-US" dirty="0" smtClean="0"/>
           </a:p>
           <a:p>
             <a:pPr marL="446088" indent="-446088">
@@ -14648,17 +14563,8 @@
             </a:pPr>
             <a:r>
               <a:rPr lang="en-US" dirty="0" smtClean="0"/>
-              <a:t>Using </a:t>
-            </a:r>
-            <a:r>
-              <a:rPr lang="en-US" dirty="0" smtClean="0"/>
-              <a:t>ASP.NET Data </a:t>
-            </a:r>
-            <a:r>
-              <a:rPr lang="en-US" dirty="0" smtClean="0"/>
-              <a:t>Source Controls</a:t>
-            </a:r>
-            <a:endParaRPr lang="en-US" dirty="0" smtClean="0"/>
+              <a:t>Using ASP.NET Data Source Controls</a:t>
+            </a:r>
           </a:p>
           <a:p>
             <a:pPr marL="712788" lvl="1" indent="-365125">
@@ -14828,12 +14734,12 @@
           <a:lstStyle/>
           <a:p>
             <a:r>
-              <a:rPr lang="bg-BG" sz="3600" dirty="0"/>
-              <a:t>ObjectDataSource with LINQ-to-SQL, ListView and FormView </a:t>
-            </a:r>
-            <a:r>
               <a:rPr lang="en-US" sz="3600" dirty="0"/>
-              <a:t>(2)</a:t>
+              <a:t>ObjectDataSource with EF, ListView and FormView </a:t>
+            </a:r>
+            <a:r>
+              <a:rPr lang="en-US" sz="3600" dirty="0" smtClean="0"/>
+              <a:t> (2)</a:t>
             </a:r>
             <a:endParaRPr lang="bg-BG" sz="3600" dirty="0"/>
           </a:p>
@@ -15467,11 +15373,11 @@
           <a:lstStyle/>
           <a:p>
             <a:r>
-              <a:rPr lang="bg-BG" sz="3600" dirty="0"/>
-              <a:t>ObjectDataSource with LINQ-to-SQL, ListView and FormView </a:t>
-            </a:r>
-            <a:r>
               <a:rPr lang="en-US" sz="3600" dirty="0"/>
+              <a:t>ObjectDataSource with EF, ListView and FormView  </a:t>
+            </a:r>
+            <a:r>
+              <a:rPr lang="en-US" sz="3600" dirty="0" smtClean="0"/>
               <a:t>(3)</a:t>
             </a:r>
             <a:endParaRPr lang="bg-BG" sz="3600" dirty="0"/>
@@ -15628,11 +15534,11 @@
           <a:lstStyle/>
           <a:p>
             <a:r>
-              <a:rPr lang="bg-BG" sz="3600" dirty="0"/>
-              <a:t>ObjectDataSource with LINQ-to-SQL, ListView and FormView </a:t>
-            </a:r>
-            <a:r>
               <a:rPr lang="en-US" sz="3600" dirty="0"/>
+              <a:t>ObjectDataSource with EF, ListView and FormView  </a:t>
+            </a:r>
+            <a:r>
+              <a:rPr lang="en-US" sz="3600" dirty="0" smtClean="0"/>
               <a:t>(4)</a:t>
             </a:r>
             <a:endParaRPr lang="bg-BG" sz="3600" dirty="0"/>
@@ -15916,11 +15822,11 @@
           <a:lstStyle/>
           <a:p>
             <a:r>
-              <a:rPr lang="bg-BG" sz="3600" dirty="0"/>
-              <a:t>ObjectDataSource with LINQ-to-SQL, ListView and FormView </a:t>
-            </a:r>
-            <a:r>
               <a:rPr lang="en-US" sz="3600" dirty="0"/>
+              <a:t>ObjectDataSource with EF, ListView and FormView  </a:t>
+            </a:r>
+            <a:r>
+              <a:rPr lang="en-US" sz="3600" dirty="0" smtClean="0"/>
               <a:t>(5)</a:t>
             </a:r>
             <a:endParaRPr lang="bg-BG" sz="3600" dirty="0"/>
@@ -16217,11 +16123,11 @@
           <a:lstStyle/>
           <a:p>
             <a:r>
-              <a:rPr lang="bg-BG" sz="3600" dirty="0"/>
-              <a:t>ObjectDataSource with LINQ-to-SQL, ListView and FormView </a:t>
-            </a:r>
-            <a:r>
               <a:rPr lang="en-US" sz="3600" dirty="0"/>
+              <a:t>ObjectDataSource with EF, ListView and FormView  </a:t>
+            </a:r>
+            <a:r>
+              <a:rPr lang="en-US" sz="3600" dirty="0" smtClean="0"/>
               <a:t>(6)</a:t>
             </a:r>
             <a:endParaRPr lang="bg-BG" sz="3600" dirty="0"/>
@@ -16482,7 +16388,7 @@
         </p:nvSpPr>
         <p:spPr>
           <a:xfrm>
-            <a:off x="228600" y="914400"/>
+            <a:off x="228600" y="838200"/>
             <a:ext cx="8686800" cy="5715000"/>
           </a:xfrm>
         </p:spPr>
@@ -16497,8 +16403,9 @@
             </a:pPr>
             <a:r>
               <a:rPr lang="en-US" noProof="1" smtClean="0"/>
-              <a:t>LinqDataSource</a:t>
-            </a:r>
+              <a:t>LinqDataSource (for LINQ-to-SQL mappings)</a:t>
+            </a:r>
+            <a:endParaRPr lang="en-US" noProof="1" smtClean="0"/>
           </a:p>
           <a:p>
             <a:pPr>
@@ -16510,7 +16417,6 @@
               <a:rPr lang="en-US" noProof="1" smtClean="0"/>
               <a:t>Hierarchical</a:t>
             </a:r>
-            <a:endParaRPr lang="en-US" noProof="1" smtClean="0"/>
           </a:p>
           <a:p>
             <a:pPr lvl="1">
@@ -16629,11 +16535,11 @@
             </a:pPr>
             <a:r>
               <a:rPr lang="en-US" noProof="1" smtClean="0"/>
-              <a:t>MS </a:t>
+              <a:t>MS Access </a:t>
             </a:r>
             <a:r>
               <a:rPr lang="en-US" noProof="1" smtClean="0"/>
-              <a:t>Access - </a:t>
+              <a:t>– </a:t>
             </a:r>
             <a:r>
               <a:rPr lang="en-US" noProof="1" smtClean="0">
@@ -16808,7 +16714,7 @@
         </p:nvSpPr>
         <p:spPr>
           <a:xfrm>
-            <a:off x="1965325" y="2438400"/>
+            <a:off x="1905000" y="2362200"/>
             <a:ext cx="5197475" cy="990600"/>
           </a:xfrm>
         </p:spPr>
@@ -16824,11 +16730,11 @@
               <a:buNone/>
             </a:pPr>
             <a:r>
-              <a:rPr lang="en-US" sz="5400" dirty="0"/>
+              <a:rPr lang="en-US" sz="6600" dirty="0"/>
               <a:t>Questions</a:t>
             </a:r>
             <a:r>
-              <a:rPr lang="bg-BG" sz="5400" dirty="0"/>
+              <a:rPr lang="bg-BG" sz="6600" dirty="0"/>
               <a:t>?</a:t>
             </a:r>
           </a:p>
@@ -17654,11 +17560,7 @@
           <a:p>
             <a:r>
               <a:rPr lang="en-US" dirty="0" smtClean="0"/>
-              <a:t>ASP.NET Data </a:t>
-            </a:r>
-            <a:r>
-              <a:rPr lang="en-US" dirty="0" smtClean="0"/>
-              <a:t>Source Controls</a:t>
+              <a:t>ASP.NET Data Source Controls</a:t>
             </a:r>
             <a:endParaRPr lang="bg-BG" dirty="0"/>
           </a:p>
@@ -19204,11 +19106,18 @@
               </a:lnSpc>
             </a:pPr>
             <a:r>
-              <a:rPr lang="en-US" i="1" dirty="0"/>
+              <a:rPr lang="en-US" dirty="0">
+                <a:solidFill>
+                  <a:schemeClr val="accent5">
+                    <a:lumMod val="20000"/>
+                    <a:lumOff val="80000"/>
+                  </a:schemeClr>
+                </a:solidFill>
+              </a:rPr>
               <a:t>Entity</a:t>
             </a:r>
             <a:r>
-              <a:rPr lang="en-US" dirty="0"/>
+              <a:rPr lang="en-US" dirty="0" smtClean="0"/>
               <a:t>: </a:t>
             </a:r>
             <a:r>
@@ -19220,16 +19129,49 @@
               <a:t>of </a:t>
             </a:r>
             <a:r>
-              <a:rPr lang="en-US" i="1" dirty="0"/>
-              <a:t>Entity Types (e.g. Employee, SalesOrder</a:t>
-            </a:r>
-            <a:r>
-              <a:rPr lang="en-US" i="1" dirty="0" smtClean="0"/>
-              <a:t>)</a:t>
+              <a:rPr lang="en-US" dirty="0">
+                <a:solidFill>
+                  <a:schemeClr val="accent5">
+                    <a:lumMod val="20000"/>
+                    <a:lumOff val="80000"/>
+                  </a:schemeClr>
+                </a:solidFill>
+              </a:rPr>
+              <a:t>Entity Types </a:t>
+            </a:r>
+            <a:r>
+              <a:rPr lang="en-US" dirty="0"/>
+              <a:t>(e.g. </a:t>
+            </a:r>
+            <a:r>
+              <a:rPr lang="en-US" dirty="0">
+                <a:solidFill>
+                  <a:schemeClr val="accent5">
+                    <a:lumMod val="20000"/>
+                    <a:lumOff val="80000"/>
+                  </a:schemeClr>
+                </a:solidFill>
+              </a:rPr>
+              <a:t>Employee</a:t>
+            </a:r>
+            <a:r>
+              <a:rPr lang="en-US" dirty="0"/>
+              <a:t>, </a:t>
+            </a:r>
+            <a:r>
+              <a:rPr lang="en-US" dirty="0">
+                <a:solidFill>
+                  <a:schemeClr val="accent5">
+                    <a:lumMod val="20000"/>
+                    <a:lumOff val="80000"/>
+                  </a:schemeClr>
+                </a:solidFill>
+              </a:rPr>
+              <a:t>SalesOrder</a:t>
             </a:r>
             <a:r>
               <a:rPr lang="en-US" dirty="0" smtClean="0"/>
-              <a:t> </a:t>
+              <a:t>) </a:t>
             </a:r>
             <a:r>
               <a:rPr lang="en-US" dirty="0"/>
@@ -19244,14 +19186,24 @@
               <a:t>in </a:t>
             </a:r>
             <a:r>
-              <a:rPr lang="en-US" i="1" dirty="0"/>
+              <a:rPr lang="en-US" dirty="0" smtClean="0">
+                <a:solidFill>
+                  <a:schemeClr val="accent5">
+                    <a:lumMod val="20000"/>
+                    <a:lumOff val="80000"/>
+                  </a:schemeClr>
+                </a:solidFill>
+              </a:rPr>
               <a:t>Entity-Sets</a:t>
             </a:r>
-            <a:r>
-              <a:rPr lang="en-US" dirty="0"/>
-              <a:t>. </a:t>
-            </a:r>
-            <a:endParaRPr lang="en-US" dirty="0" smtClean="0"/>
+            <a:endParaRPr lang="en-US" dirty="0" smtClean="0">
+              <a:solidFill>
+                <a:schemeClr val="accent5">
+                  <a:lumMod val="20000"/>
+                  <a:lumOff val="80000"/>
+                </a:schemeClr>
+              </a:solidFill>
+            </a:endParaRPr>
           </a:p>
           <a:p>
             <a:pPr lvl="1">
@@ -19260,12 +19212,19 @@
               </a:lnSpc>
             </a:pPr>
             <a:r>
-              <a:rPr lang="en-US" i="1" dirty="0"/>
-              <a:t>Relationship:</a:t>
-            </a:r>
-            <a:r>
-              <a:rPr lang="en-US" dirty="0"/>
-              <a:t> </a:t>
+              <a:rPr lang="en-US" dirty="0">
+                <a:solidFill>
+                  <a:schemeClr val="accent5">
+                    <a:lumMod val="20000"/>
+                    <a:lumOff val="80000"/>
+                  </a:schemeClr>
+                </a:solidFill>
+              </a:rPr>
+              <a:t>Relationship</a:t>
+            </a:r>
+            <a:r>
+              <a:rPr lang="en-US" dirty="0" smtClean="0"/>
+              <a:t>: </a:t>
             </a:r>
             <a:r>
               <a:rPr lang="en-US" dirty="0" smtClean="0"/>
@@ -19276,20 +19235,45 @@
               <a:t>entities, and are instances of </a:t>
             </a:r>
             <a:r>
-              <a:rPr lang="en-US" i="1" dirty="0"/>
-              <a:t>Relationship Types</a:t>
+              <a:rPr lang="en-US" dirty="0">
+                <a:solidFill>
+                  <a:schemeClr val="accent5">
+                    <a:lumMod val="20000"/>
+                    <a:lumOff val="80000"/>
+                  </a:schemeClr>
+                </a:solidFill>
+              </a:rPr>
+              <a:t>Relationship Types </a:t>
             </a:r>
             <a:r>
               <a:rPr lang="en-US" dirty="0"/>
-              <a:t> (e.g. SalesOrder </a:t>
-            </a:r>
-            <a:r>
-              <a:rPr lang="en-US" i="1" u="sng" dirty="0"/>
-              <a:t>posted-by</a:t>
+              <a:t>(e.g. </a:t>
+            </a:r>
+            <a:r>
+              <a:rPr lang="en-US" dirty="0">
+                <a:solidFill>
+                  <a:schemeClr val="accent5">
+                    <a:lumMod val="20000"/>
+                    <a:lumOff val="80000"/>
+                  </a:schemeClr>
+                </a:solidFill>
+              </a:rPr>
+              <a:t>SalesOrder </a:t>
             </a:r>
             <a:r>
               <a:rPr lang="en-US" dirty="0"/>
-              <a:t> SalesPerson</a:t>
+              <a:t>posted-by </a:t>
+            </a:r>
+            <a:r>
+              <a:rPr lang="en-US" dirty="0">
+                <a:solidFill>
+                  <a:schemeClr val="accent5">
+                    <a:lumMod val="20000"/>
+                    <a:lumOff val="80000"/>
+                  </a:schemeClr>
+                </a:solidFill>
+              </a:rPr>
+              <a:t>SalesPerson</a:t>
             </a:r>
             <a:r>
               <a:rPr lang="en-US" dirty="0" smtClean="0"/>
@@ -19300,14 +19284,24 @@
               <a:t>in </a:t>
             </a:r>
             <a:r>
-              <a:rPr lang="en-US" i="1" dirty="0"/>
+              <a:rPr lang="en-US" dirty="0" smtClean="0">
+                <a:solidFill>
+                  <a:schemeClr val="accent5">
+                    <a:lumMod val="20000"/>
+                    <a:lumOff val="80000"/>
+                  </a:schemeClr>
+                </a:solidFill>
+              </a:rPr>
               <a:t>Relationship-Sets</a:t>
             </a:r>
-            <a:r>
-              <a:rPr lang="en-US" dirty="0" smtClean="0"/>
-              <a:t>.</a:t>
-            </a:r>
-            <a:endParaRPr lang="en-US" dirty="0"/>
+            <a:endParaRPr lang="en-US" dirty="0">
+              <a:solidFill>
+                <a:schemeClr val="accent5">
+                  <a:lumMod val="20000"/>
+                  <a:lumOff val="80000"/>
+                </a:schemeClr>
+              </a:solidFill>
+            </a:endParaRPr>
           </a:p>
           <a:p>
             <a:pPr lvl="1">
@@ -19468,8 +19462,9 @@
             </a:r>
             <a:r>
               <a:rPr lang="en-US" dirty="0" smtClean="0"/>
-              <a:t>EDM.</a:t>
-            </a:r>
+              <a:t>EDM</a:t>
+            </a:r>
+            <a:endParaRPr lang="en-US" dirty="0" smtClean="0"/>
           </a:p>
           <a:p>
             <a:pPr>
@@ -19506,7 +19501,14 @@
               <a:t>the application </a:t>
             </a:r>
             <a:r>
-              <a:rPr lang="en-US" u="sng" dirty="0"/>
+              <a:rPr lang="en-US" dirty="0">
+                <a:solidFill>
+                  <a:schemeClr val="accent5">
+                    <a:lumMod val="20000"/>
+                    <a:lumOff val="80000"/>
+                  </a:schemeClr>
+                </a:solidFill>
+              </a:rPr>
               <a:t>without</a:t>
             </a:r>
             <a:r>

</xml_diff>